<commit_message>
Added new project file
</commit_message>
<xml_diff>
--- a/Building a portfolio that beats the market.pptx
+++ b/Building a portfolio that beats the market.pptx
@@ -3389,7 +3389,7 @@
           <a:p>
             <a:r>
               <a:rPr lang="en-SG" dirty="0"/>
-              <a:t>Building a one year portfolio that beats the market</a:t>
+              <a:t>Can Fundamental Ratios help to outperform the market?</a:t>
             </a:r>
           </a:p>
         </p:txBody>
@@ -3416,121 +3416,6 @@
           <a:lstStyle/>
           <a:p>
             <a:endParaRPr lang="en-SG" dirty="0"/>
-          </a:p>
-        </p:txBody>
-      </p:sp>
-      <p:sp>
-        <p:nvSpPr>
-          <p:cNvPr id="4" name="Rectangle 1">
-            <a:extLst>
-              <a:ext uri="{FF2B5EF4-FFF2-40B4-BE49-F238E27FC236}">
-                <a16:creationId xmlns:a16="http://schemas.microsoft.com/office/drawing/2014/main" id="{717DF8D0-CB26-9774-7E27-19193EB25BE3}"/>
-              </a:ext>
-            </a:extLst>
-          </p:cNvPr>
-          <p:cNvSpPr>
-            <a:spLocks noChangeArrowheads="1"/>
-          </p:cNvSpPr>
-          <p:nvPr/>
-        </p:nvSpPr>
-        <p:spPr bwMode="auto">
-          <a:xfrm>
-            <a:off x="0" y="0"/>
-            <a:ext cx="12192000" cy="457200"/>
-          </a:xfrm>
-          <a:prstGeom prst="rect">
-            <a:avLst/>
-          </a:prstGeom>
-          <a:solidFill>
-            <a:srgbClr val="181A1B"/>
-          </a:solidFill>
-          <a:ln>
-            <a:noFill/>
-          </a:ln>
-          <a:effectLst/>
-          <a:extLst>
-            <a:ext uri="{91240B29-F687-4F45-9708-019B960494DF}">
-              <a14:hiddenLine xmlns:a14="http://schemas.microsoft.com/office/drawing/2010/main" w="9525">
-                <a:solidFill>
-                  <a:schemeClr val="tx1"/>
-                </a:solidFill>
-                <a:miter lim="800000"/>
-                <a:headEnd/>
-                <a:tailEnd/>
-              </a14:hiddenLine>
-            </a:ext>
-            <a:ext uri="{AF507438-7753-43E0-B8FC-AC1667EBCBE1}">
-              <a14:hiddenEffects xmlns:a14="http://schemas.microsoft.com/office/drawing/2010/main">
-                <a:effectLst>
-                  <a:outerShdw dist="35921" dir="2700000" algn="ctr" rotWithShape="0">
-                    <a:schemeClr val="bg2"/>
-                  </a:outerShdw>
-                </a:effectLst>
-              </a14:hiddenEffects>
-            </a:ext>
-          </a:extLst>
-        </p:spPr>
-        <p:txBody>
-          <a:bodyPr vert="horz" wrap="none" lIns="0" tIns="0" rIns="0" bIns="0" numCol="1" anchor="ctr" anchorCtr="0" compatLnSpc="1">
-            <a:prstTxWarp prst="textNoShape">
-              <a:avLst/>
-            </a:prstTxWarp>
-            <a:spAutoFit/>
-          </a:bodyPr>
-          <a:lstStyle/>
-          <a:p>
-            <a:pPr marL="0" marR="0" lvl="0" indent="0" algn="l" defTabSz="914400" rtl="0" eaLnBrk="0" fontAlgn="base" latinLnBrk="0" hangingPunct="0">
-              <a:lnSpc>
-                <a:spcPct val="100000"/>
-              </a:lnSpc>
-              <a:spcBef>
-                <a:spcPct val="0"/>
-              </a:spcBef>
-              <a:spcAft>
-                <a:spcPct val="0"/>
-              </a:spcAft>
-              <a:buClrTx/>
-              <a:buSzTx/>
-              <a:buFontTx/>
-              <a:buNone/>
-              <a:tabLst/>
-            </a:pPr>
-            <a:r>
-              <a:rPr kumimoji="0" lang="en-US" altLang="en-US" sz="1000" b="0" i="0" u="none" strike="noStrike" cap="none" normalizeH="0" baseline="0">
-                <a:ln>
-                  <a:noFill/>
-                </a:ln>
-                <a:solidFill>
-                  <a:srgbClr val="E8E6E3"/>
-                </a:solidFill>
-                <a:effectLst/>
-                <a:latin typeface="Arial Unicode MS"/>
-                <a:ea typeface="Courier New" panose="02070309020205020404" pitchFamily="49" charset="0"/>
-              </a:rPr>
-              <a:t>0.23172422345963195</a:t>
-            </a:r>
-            <a:r>
-              <a:rPr kumimoji="0" lang="en-US" altLang="en-US" sz="700" b="0" i="0" u="none" strike="noStrike" cap="none" normalizeH="0" baseline="0">
-                <a:ln>
-                  <a:noFill/>
-                </a:ln>
-                <a:solidFill>
-                  <a:schemeClr val="tx1"/>
-                </a:solidFill>
-                <a:effectLst/>
-              </a:rPr>
-              <a:t> </a:t>
-            </a:r>
-            <a:endParaRPr kumimoji="0" lang="en-US" altLang="en-US" sz="1800" b="0" i="0" u="none" strike="noStrike" cap="none" normalizeH="0" baseline="0">
-              <a:ln>
-                <a:noFill/>
-              </a:ln>
-              <a:solidFill>
-                <a:schemeClr val="tx1"/>
-              </a:solidFill>
-              <a:effectLst/>
-              <a:latin typeface="Arial" panose="020B0604020202020204" pitchFamily="34" charset="0"/>
-            </a:endParaRPr>
           </a:p>
         </p:txBody>
       </p:sp>
@@ -5522,7 +5407,384 @@
           <a:p>
             <a:r>
               <a:rPr lang="en-SG" dirty="0"/>
-              <a:t>Using regression techniques to build a portfolio that can beat market returns</a:t>
+              <a:t>Finding out whether fundamental financial ratios during quarterly reporting can be a good predictor for future returns</a:t>
+            </a:r>
+          </a:p>
+          <a:p>
+            <a:endParaRPr lang="en-SG" dirty="0"/>
+          </a:p>
+          <a:p>
+            <a:endParaRPr lang="en-SG" dirty="0"/>
+          </a:p>
+        </p:txBody>
+      </p:sp>
+      <p:sp>
+        <p:nvSpPr>
+          <p:cNvPr id="4" name="Rectangle 3">
+            <a:extLst>
+              <a:ext uri="{FF2B5EF4-FFF2-40B4-BE49-F238E27FC236}">
+                <a16:creationId xmlns:a16="http://schemas.microsoft.com/office/drawing/2014/main" id="{245E1038-7EDF-71DA-6F27-2E253F2A8373}"/>
+              </a:ext>
+            </a:extLst>
+          </p:cNvPr>
+          <p:cNvSpPr/>
+          <p:nvPr/>
+        </p:nvSpPr>
+        <p:spPr>
+          <a:xfrm>
+            <a:off x="1487714" y="3429000"/>
+            <a:ext cx="9216571" cy="366486"/>
+          </a:xfrm>
+          <a:prstGeom prst="rect">
+            <a:avLst/>
+          </a:prstGeom>
+        </p:spPr>
+        <p:style>
+          <a:lnRef idx="2">
+            <a:schemeClr val="accent1">
+              <a:shade val="50000"/>
+            </a:schemeClr>
+          </a:lnRef>
+          <a:fillRef idx="1">
+            <a:schemeClr val="accent1"/>
+          </a:fillRef>
+          <a:effectRef idx="0">
+            <a:schemeClr val="accent1"/>
+          </a:effectRef>
+          <a:fontRef idx="minor">
+            <a:schemeClr val="lt1"/>
+          </a:fontRef>
+        </p:style>
+        <p:txBody>
+          <a:bodyPr rtlCol="0" anchor="ctr"/>
+          <a:lstStyle/>
+          <a:p>
+            <a:pPr algn="ctr"/>
+            <a:r>
+              <a:rPr lang="en-SG" dirty="0"/>
+              <a:t>Financial Statements available</a:t>
+            </a:r>
+          </a:p>
+        </p:txBody>
+      </p:sp>
+      <p:sp>
+        <p:nvSpPr>
+          <p:cNvPr id="6" name="TextBox 5">
+            <a:extLst>
+              <a:ext uri="{FF2B5EF4-FFF2-40B4-BE49-F238E27FC236}">
+                <a16:creationId xmlns:a16="http://schemas.microsoft.com/office/drawing/2014/main" id="{82D10540-2CAF-769C-A649-2B32AA17FE3F}"/>
+              </a:ext>
+            </a:extLst>
+          </p:cNvPr>
+          <p:cNvSpPr txBox="1"/>
+          <p:nvPr/>
+        </p:nvSpPr>
+        <p:spPr>
+          <a:xfrm>
+            <a:off x="4299856" y="4001294"/>
+            <a:ext cx="885372" cy="366486"/>
+          </a:xfrm>
+          <a:prstGeom prst="rect">
+            <a:avLst/>
+          </a:prstGeom>
+          <a:noFill/>
+        </p:spPr>
+        <p:txBody>
+          <a:bodyPr wrap="square" rtlCol="0">
+            <a:spAutoFit/>
+          </a:bodyPr>
+          <a:lstStyle/>
+          <a:p>
+            <a:r>
+              <a:rPr lang="en-SG" dirty="0"/>
+              <a:t>2018</a:t>
+            </a:r>
+          </a:p>
+        </p:txBody>
+      </p:sp>
+      <p:sp>
+        <p:nvSpPr>
+          <p:cNvPr id="7" name="TextBox 6">
+            <a:extLst>
+              <a:ext uri="{FF2B5EF4-FFF2-40B4-BE49-F238E27FC236}">
+                <a16:creationId xmlns:a16="http://schemas.microsoft.com/office/drawing/2014/main" id="{B341997D-3807-6EA7-96DA-05FDA66016BF}"/>
+              </a:ext>
+            </a:extLst>
+          </p:cNvPr>
+          <p:cNvSpPr txBox="1"/>
+          <p:nvPr/>
+        </p:nvSpPr>
+        <p:spPr>
+          <a:xfrm>
+            <a:off x="2427513" y="4001294"/>
+            <a:ext cx="885372" cy="366486"/>
+          </a:xfrm>
+          <a:prstGeom prst="rect">
+            <a:avLst/>
+          </a:prstGeom>
+          <a:noFill/>
+        </p:spPr>
+        <p:txBody>
+          <a:bodyPr wrap="square" rtlCol="0">
+            <a:spAutoFit/>
+          </a:bodyPr>
+          <a:lstStyle/>
+          <a:p>
+            <a:r>
+              <a:rPr lang="en-SG" dirty="0"/>
+              <a:t>2017</a:t>
+            </a:r>
+          </a:p>
+        </p:txBody>
+      </p:sp>
+      <p:sp>
+        <p:nvSpPr>
+          <p:cNvPr id="8" name="TextBox 7">
+            <a:extLst>
+              <a:ext uri="{FF2B5EF4-FFF2-40B4-BE49-F238E27FC236}">
+                <a16:creationId xmlns:a16="http://schemas.microsoft.com/office/drawing/2014/main" id="{6B4970BF-06DD-4D36-8211-5DDA144C665D}"/>
+              </a:ext>
+            </a:extLst>
+          </p:cNvPr>
+          <p:cNvSpPr txBox="1"/>
+          <p:nvPr/>
+        </p:nvSpPr>
+        <p:spPr>
+          <a:xfrm>
+            <a:off x="6095999" y="4001294"/>
+            <a:ext cx="885372" cy="366486"/>
+          </a:xfrm>
+          <a:prstGeom prst="rect">
+            <a:avLst/>
+          </a:prstGeom>
+          <a:noFill/>
+        </p:spPr>
+        <p:txBody>
+          <a:bodyPr wrap="square" rtlCol="0">
+            <a:spAutoFit/>
+          </a:bodyPr>
+          <a:lstStyle/>
+          <a:p>
+            <a:r>
+              <a:rPr lang="en-SG" dirty="0"/>
+              <a:t>2019</a:t>
+            </a:r>
+          </a:p>
+        </p:txBody>
+      </p:sp>
+      <p:sp>
+        <p:nvSpPr>
+          <p:cNvPr id="9" name="TextBox 8">
+            <a:extLst>
+              <a:ext uri="{FF2B5EF4-FFF2-40B4-BE49-F238E27FC236}">
+                <a16:creationId xmlns:a16="http://schemas.microsoft.com/office/drawing/2014/main" id="{F458E140-22B0-2DEC-CE85-A26D3A6E8CC9}"/>
+              </a:ext>
+            </a:extLst>
+          </p:cNvPr>
+          <p:cNvSpPr txBox="1"/>
+          <p:nvPr/>
+        </p:nvSpPr>
+        <p:spPr>
+          <a:xfrm>
+            <a:off x="7892142" y="4001294"/>
+            <a:ext cx="885372" cy="366486"/>
+          </a:xfrm>
+          <a:prstGeom prst="rect">
+            <a:avLst/>
+          </a:prstGeom>
+          <a:noFill/>
+        </p:spPr>
+        <p:txBody>
+          <a:bodyPr wrap="square" rtlCol="0">
+            <a:spAutoFit/>
+          </a:bodyPr>
+          <a:lstStyle/>
+          <a:p>
+            <a:r>
+              <a:rPr lang="en-SG" dirty="0"/>
+              <a:t>2020</a:t>
+            </a:r>
+          </a:p>
+        </p:txBody>
+      </p:sp>
+      <p:sp>
+        <p:nvSpPr>
+          <p:cNvPr id="10" name="TextBox 9">
+            <a:extLst>
+              <a:ext uri="{FF2B5EF4-FFF2-40B4-BE49-F238E27FC236}">
+                <a16:creationId xmlns:a16="http://schemas.microsoft.com/office/drawing/2014/main" id="{5F3CBFFF-D2E0-D247-F0E3-F39017F1BAEF}"/>
+              </a:ext>
+            </a:extLst>
+          </p:cNvPr>
+          <p:cNvSpPr txBox="1"/>
+          <p:nvPr/>
+        </p:nvSpPr>
+        <p:spPr>
+          <a:xfrm>
+            <a:off x="9622971" y="4001294"/>
+            <a:ext cx="885372" cy="366486"/>
+          </a:xfrm>
+          <a:prstGeom prst="rect">
+            <a:avLst/>
+          </a:prstGeom>
+          <a:noFill/>
+        </p:spPr>
+        <p:txBody>
+          <a:bodyPr wrap="square" rtlCol="0">
+            <a:spAutoFit/>
+          </a:bodyPr>
+          <a:lstStyle/>
+          <a:p>
+            <a:r>
+              <a:rPr lang="en-SG" dirty="0"/>
+              <a:t>2021</a:t>
+            </a:r>
+          </a:p>
+        </p:txBody>
+      </p:sp>
+      <p:sp>
+        <p:nvSpPr>
+          <p:cNvPr id="11" name="Rectangle 10">
+            <a:extLst>
+              <a:ext uri="{FF2B5EF4-FFF2-40B4-BE49-F238E27FC236}">
+                <a16:creationId xmlns:a16="http://schemas.microsoft.com/office/drawing/2014/main" id="{85567B39-A369-82FE-A80D-712BEB654EF9}"/>
+              </a:ext>
+            </a:extLst>
+          </p:cNvPr>
+          <p:cNvSpPr/>
+          <p:nvPr/>
+        </p:nvSpPr>
+        <p:spPr>
+          <a:xfrm>
+            <a:off x="2714171" y="4367780"/>
+            <a:ext cx="5529943" cy="366486"/>
+          </a:xfrm>
+          <a:prstGeom prst="rect">
+            <a:avLst/>
+          </a:prstGeom>
+        </p:spPr>
+        <p:style>
+          <a:lnRef idx="2">
+            <a:schemeClr val="accent1">
+              <a:shade val="50000"/>
+            </a:schemeClr>
+          </a:lnRef>
+          <a:fillRef idx="1">
+            <a:schemeClr val="accent1"/>
+          </a:fillRef>
+          <a:effectRef idx="0">
+            <a:schemeClr val="accent1"/>
+          </a:effectRef>
+          <a:fontRef idx="minor">
+            <a:schemeClr val="lt1"/>
+          </a:fontRef>
+        </p:style>
+        <p:txBody>
+          <a:bodyPr rtlCol="0" anchor="ctr"/>
+          <a:lstStyle/>
+          <a:p>
+            <a:pPr algn="ctr"/>
+            <a:r>
+              <a:rPr lang="en-SG" dirty="0"/>
+              <a:t>Used for train-test-split</a:t>
+            </a:r>
+          </a:p>
+        </p:txBody>
+      </p:sp>
+      <p:sp>
+        <p:nvSpPr>
+          <p:cNvPr id="12" name="Rectangle 11">
+            <a:extLst>
+              <a:ext uri="{FF2B5EF4-FFF2-40B4-BE49-F238E27FC236}">
+                <a16:creationId xmlns:a16="http://schemas.microsoft.com/office/drawing/2014/main" id="{5D36D2BB-A9A8-E77C-4FC2-5B37FC03198D}"/>
+              </a:ext>
+            </a:extLst>
+          </p:cNvPr>
+          <p:cNvSpPr/>
+          <p:nvPr/>
+        </p:nvSpPr>
+        <p:spPr>
+          <a:xfrm>
+            <a:off x="8244114" y="4940073"/>
+            <a:ext cx="1886857" cy="1371827"/>
+          </a:xfrm>
+          <a:prstGeom prst="rect">
+            <a:avLst/>
+          </a:prstGeom>
+        </p:spPr>
+        <p:style>
+          <a:lnRef idx="2">
+            <a:schemeClr val="accent1">
+              <a:shade val="50000"/>
+            </a:schemeClr>
+          </a:lnRef>
+          <a:fillRef idx="1">
+            <a:schemeClr val="accent1"/>
+          </a:fillRef>
+          <a:effectRef idx="0">
+            <a:schemeClr val="accent1"/>
+          </a:effectRef>
+          <a:fontRef idx="minor">
+            <a:schemeClr val="lt1"/>
+          </a:fontRef>
+        </p:style>
+        <p:txBody>
+          <a:bodyPr rtlCol="0" anchor="ctr"/>
+          <a:lstStyle/>
+          <a:p>
+            <a:pPr algn="ctr"/>
+            <a:r>
+              <a:rPr lang="en-SG" dirty="0"/>
+              <a:t>Used to forward test and see how it performs during volatile market conditions</a:t>
+            </a:r>
+          </a:p>
+        </p:txBody>
+      </p:sp>
+      <p:sp>
+        <p:nvSpPr>
+          <p:cNvPr id="13" name="Rectangle 12">
+            <a:extLst>
+              <a:ext uri="{FF2B5EF4-FFF2-40B4-BE49-F238E27FC236}">
+                <a16:creationId xmlns:a16="http://schemas.microsoft.com/office/drawing/2014/main" id="{BCD8872D-D955-6109-74A0-D688987026DB}"/>
+              </a:ext>
+            </a:extLst>
+          </p:cNvPr>
+          <p:cNvSpPr/>
+          <p:nvPr/>
+        </p:nvSpPr>
+        <p:spPr>
+          <a:xfrm>
+            <a:off x="10305143" y="4940074"/>
+            <a:ext cx="1698171" cy="1236890"/>
+          </a:xfrm>
+          <a:prstGeom prst="rect">
+            <a:avLst/>
+          </a:prstGeom>
+        </p:spPr>
+        <p:style>
+          <a:lnRef idx="2">
+            <a:schemeClr val="accent1">
+              <a:shade val="50000"/>
+            </a:schemeClr>
+          </a:lnRef>
+          <a:fillRef idx="1">
+            <a:schemeClr val="accent1"/>
+          </a:fillRef>
+          <a:effectRef idx="0">
+            <a:schemeClr val="accent1"/>
+          </a:effectRef>
+          <a:fontRef idx="minor">
+            <a:schemeClr val="lt1"/>
+          </a:fontRef>
+        </p:style>
+        <p:txBody>
+          <a:bodyPr rtlCol="0" anchor="ctr"/>
+          <a:lstStyle/>
+          <a:p>
+            <a:pPr algn="ctr"/>
+            <a:r>
+              <a:rPr lang="en-SG" dirty="0"/>
+              <a:t>Do a subset study for 2021 and 2022</a:t>
             </a:r>
           </a:p>
         </p:txBody>

</xml_diff>